<commit_message>
Anpassungen Präsentation und Wordvorlagen
</commit_message>
<xml_diff>
--- a/documents/00_Sitzungen/Milestone_1/Meilenstein1.pptx
+++ b/documents/00_Sitzungen/Milestone_1/Meilenstein1.pptx
@@ -5624,20 +5624,37 @@
           <a:p>
             <a:r>
               <a:rPr lang="de-CH" sz="3600" dirty="0"/>
-              <a:t>Noch offen: #14, #56, #57</a:t>
+              <a:t>Neu: #59 (Abnahmetests Definition)</a:t>
             </a:r>
           </a:p>
           <a:p>
             <a:r>
               <a:rPr lang="de-CH" sz="3600" dirty="0"/>
-              <a:t>Verschoben: #15, #16</a:t>
+              <a:t>Verschoben: #15, #16 (Testklassen)</a:t>
             </a:r>
           </a:p>
           <a:p>
             <a:r>
               <a:rPr lang="de-CH" sz="3600" dirty="0"/>
-              <a:t>Bearbeitet mit Abschluss Milestone 2: #17</a:t>
-            </a:r>
+              <a:t>Bearbeitet mit Abschluss Milestone 2: </a:t>
+            </a:r>
+          </a:p>
+          <a:p>
+            <a:pPr lvl="1"/>
+            <a:r>
+              <a:rPr lang="de-CH" sz="3200" dirty="0"/>
+              <a:t>#14 JS Eingabe</a:t>
+            </a:r>
+          </a:p>
+          <a:p>
+            <a:pPr lvl="1"/>
+            <a:r>
+              <a:rPr lang="de-CH" sz="3200" dirty="0"/>
+              <a:t>#17 Code Guidelines</a:t>
+            </a:r>
+          </a:p>
+          <a:p>
+            <a:endParaRPr lang="de-CH" sz="3600" dirty="0"/>
           </a:p>
         </p:txBody>
       </p:sp>
@@ -5982,7 +5999,7 @@
           <a:p>
             <a:r>
               <a:rPr lang="de-CH" sz="3600" dirty="0"/>
-              <a:t>Wünsche</a:t>
+              <a:t>Anregungen</a:t>
             </a:r>
           </a:p>
         </p:txBody>
@@ -6142,19 +6159,19 @@
           <a:p>
             <a:r>
               <a:rPr lang="de-CH" sz="3600" dirty="0"/>
-              <a:t>Aufwand Anzeige falls gewünscht</a:t>
+              <a:t>Aufwand Anzeige Tanken zusätzlich: ~20h</a:t>
             </a:r>
           </a:p>
           <a:p>
             <a:r>
               <a:rPr lang="de-CH" sz="3600" dirty="0"/>
-              <a:t>Zusätzliche Anforderungen GUI</a:t>
+              <a:t>Anforderungen GUI</a:t>
             </a:r>
           </a:p>
           <a:p>
             <a:r>
               <a:rPr lang="de-CH" sz="3600" dirty="0"/>
-              <a:t>Zusätzliche Funktionswünsche</a:t>
+              <a:t>Inputs durch Kunde</a:t>
             </a:r>
           </a:p>
           <a:p>

</xml_diff>